<commit_message>
Initial redux and others files and components.
</commit_message>
<xml_diff>
--- a/מצגת אפיון.pptx  -  לקריאה בלבד.pptx
+++ b/מצגת אפיון.pptx  -  לקריאה בלבד.pptx
@@ -6484,23 +6484,7 @@
                   <a:schemeClr val="dk1"/>
                 </a:solidFill>
               </a:rPr>
-              <a:t> אסף עובדיה - </a:t>
-            </a:r>
-            <a:r>
-              <a:rPr lang="en-US" sz="2850">
-                <a:solidFill>
-                  <a:schemeClr val="dk1"/>
-                </a:solidFill>
-              </a:rPr>
-              <a:t>88888888</a:t>
-            </a:r>
-            <a:r>
-              <a:rPr lang="he-IL" sz="2850" dirty="0">
-                <a:solidFill>
-                  <a:schemeClr val="dk1"/>
-                </a:solidFill>
-              </a:rPr>
-              <a:t>					  רווה פנחס - </a:t>
+              <a:t> רווה פנחס - </a:t>
             </a:r>
             <a:r>
               <a:rPr lang="en-US" sz="2850" dirty="0">
@@ -8013,7 +7997,7 @@
         </p:nvCxnSpPr>
         <p:spPr>
           <a:xfrm flipH="1">
-            <a:off x="5008156" y="3086730"/>
+            <a:off x="5044612" y="2689894"/>
             <a:ext cx="1045029" cy="514036"/>
           </a:xfrm>
           <a:prstGeom prst="straightConnector1">
@@ -8155,7 +8139,7 @@
         </p:nvSpPr>
         <p:spPr>
           <a:xfrm>
-            <a:off x="6366424" y="2247042"/>
+            <a:off x="6783495" y="1733006"/>
             <a:ext cx="1890676" cy="1353724"/>
           </a:xfrm>
           <a:prstGeom prst="rect">
@@ -8235,12 +8219,103 @@
             <a:pPr algn="ctr"/>
             <a:r>
               <a:rPr lang="he-IL" dirty="0"/>
-              <a:t>שליחת הכסף על המוכר</a:t>
+              <a:t>אישור</a:t>
             </a:r>
             <a:endParaRPr lang="en-US" dirty="0"/>
           </a:p>
         </p:txBody>
       </p:sp>
+      <p:sp>
+        <p:nvSpPr>
+          <p:cNvPr id="5" name="Rectangle 7">
+            <a:extLst>
+              <a:ext uri="{FF2B5EF4-FFF2-40B4-BE49-F238E27FC236}">
+                <a16:creationId xmlns:a16="http://schemas.microsoft.com/office/drawing/2014/main" id="{5535A5A6-B93A-AB32-49EF-95E2A0B0C09C}"/>
+              </a:ext>
+            </a:extLst>
+          </p:cNvPr>
+          <p:cNvSpPr/>
+          <p:nvPr/>
+        </p:nvSpPr>
+        <p:spPr>
+          <a:xfrm>
+            <a:off x="5107847" y="3846202"/>
+            <a:ext cx="1890676" cy="1353724"/>
+          </a:xfrm>
+          <a:prstGeom prst="rect">
+            <a:avLst/>
+          </a:prstGeom>
+        </p:spPr>
+        <p:style>
+          <a:lnRef idx="2">
+            <a:schemeClr val="accent1">
+              <a:shade val="50000"/>
+            </a:schemeClr>
+          </a:lnRef>
+          <a:fillRef idx="1">
+            <a:schemeClr val="accent1"/>
+          </a:fillRef>
+          <a:effectRef idx="0">
+            <a:schemeClr val="accent1"/>
+          </a:effectRef>
+          <a:fontRef idx="minor">
+            <a:schemeClr val="lt1"/>
+          </a:fontRef>
+        </p:style>
+        <p:txBody>
+          <a:bodyPr rtlCol="0" anchor="ctr"/>
+          <a:lstStyle/>
+          <a:p>
+            <a:pPr algn="ctr"/>
+            <a:r>
+              <a:rPr lang="he-IL" dirty="0"/>
+              <a:t>דחייה</a:t>
+            </a:r>
+            <a:endParaRPr lang="en-US" dirty="0"/>
+          </a:p>
+        </p:txBody>
+      </p:sp>
+      <p:cxnSp>
+        <p:nvCxnSpPr>
+          <p:cNvPr id="6" name="Straight Arrow Connector 14">
+            <a:extLst>
+              <a:ext uri="{FF2B5EF4-FFF2-40B4-BE49-F238E27FC236}">
+                <a16:creationId xmlns:a16="http://schemas.microsoft.com/office/drawing/2014/main" id="{29F50CCB-62CE-C91A-29DB-3B5C18860A9F}"/>
+              </a:ext>
+            </a:extLst>
+          </p:cNvPr>
+          <p:cNvCxnSpPr>
+            <a:cxnSpLocks/>
+          </p:cNvCxnSpPr>
+          <p:nvPr/>
+        </p:nvCxnSpPr>
+        <p:spPr>
+          <a:xfrm flipH="1">
+            <a:off x="7162511" y="3203930"/>
+            <a:ext cx="152400" cy="793672"/>
+          </a:xfrm>
+          <a:prstGeom prst="straightConnector1">
+            <a:avLst/>
+          </a:prstGeom>
+          <a:ln w="57150">
+            <a:tailEnd type="triangle"/>
+          </a:ln>
+        </p:spPr>
+        <p:style>
+          <a:lnRef idx="1">
+            <a:schemeClr val="accent1"/>
+          </a:lnRef>
+          <a:fillRef idx="0">
+            <a:schemeClr val="accent1"/>
+          </a:fillRef>
+          <a:effectRef idx="0">
+            <a:schemeClr val="accent1"/>
+          </a:effectRef>
+          <a:fontRef idx="minor">
+            <a:schemeClr val="tx1"/>
+          </a:fontRef>
+        </p:style>
+      </p:cxnSp>
     </p:spTree>
     <p:extLst>
       <p:ext uri="{BB962C8B-B14F-4D97-AF65-F5344CB8AC3E}">

</xml_diff>